<commit_message>
utilidades para actualizar tarifas
</commit_message>
<xml_diff>
--- a/uploads/informes/1/146.pptx
+++ b/uploads/informes/1/146.pptx
@@ -3076,6 +3076,38 @@
           <a:p>
             <a:pPr algn="l" fontAlgn="base" marL="0" marR="0" indent="0" lvl="0"/>
             <a:r>
+              <a:rPr b="false" i="false" strike="noStrike" sz="1600" u="none">
+                <a:solidFill>
+                  <a:srgbClr val="000000"/>
+                </a:solidFill>
+                <a:latin typeface="Calibri"/>
+              </a:rPr>
+              <a:t><![CDATA[Código: N/A]]></a:t>
+            </a:r>
+          </a:p>
+        </p:txBody>
+      </p:sp>
+      <p:sp>
+        <p:nvSpPr>
+          <p:cNvPr id="6" name=""/>
+          <p:cNvSpPr txBox="1"/>
+          <p:nvPr/>
+        </p:nvSpPr>
+        <p:spPr>
+          <a:xfrm rot="0">
+            <a:off x="1143000" y="1714500"/>
+            <a:ext cx="5715000" cy="2857500"/>
+          </a:xfrm>
+          <a:prstGeom prst="rect"/>
+        </p:spPr>
+        <p:txBody>
+          <a:bodyPr wrap="square" rtlCol="0" horzOverflow="overflow" vertOverflow="overflow" bIns="45720" lIns="91440" rIns="91440" tIns="45720" numCol="1">
+            <a:spAutoFit/>
+          </a:bodyPr>
+          <a:lstStyle/>
+          <a:p>
+            <a:pPr algn="l" fontAlgn="base" marL="0" marR="0" indent="0" lvl="0"/>
+            <a:r>
               <a:rPr b="false" i="false" strike="noStrike" sz="1400" u="none">
                 <a:solidFill>
                   <a:srgbClr val="000000"/>
@@ -3089,13 +3121,13 @@
       </p:sp>
       <p:sp>
         <p:nvSpPr>
-          <p:cNvPr id="6" name=""/>
+          <p:cNvPr id="7" name=""/>
           <p:cNvSpPr txBox="1"/>
           <p:nvPr/>
         </p:nvSpPr>
         <p:spPr>
           <a:xfrm rot="0">
-            <a:off x="1143000" y="1714500"/>
+            <a:off x="1143000" y="1905000"/>
             <a:ext cx="5715000" cy="2857500"/>
           </a:xfrm>
           <a:prstGeom prst="rect"/>
@@ -3121,13 +3153,13 @@
       </p:sp>
       <p:sp>
         <p:nvSpPr>
-          <p:cNvPr id="7" name=""/>
+          <p:cNvPr id="8" name=""/>
           <p:cNvSpPr txBox="1"/>
           <p:nvPr/>
         </p:nvSpPr>
         <p:spPr>
           <a:xfrm rot="0">
-            <a:off x="1143000" y="1905000"/>
+            <a:off x="1143000" y="2095500"/>
             <a:ext cx="5715000" cy="2857500"/>
           </a:xfrm>
           <a:prstGeom prst="rect"/>
@@ -3153,13 +3185,13 @@
       </p:sp>
       <p:sp>
         <p:nvSpPr>
-          <p:cNvPr id="8" name=""/>
+          <p:cNvPr id="9" name=""/>
           <p:cNvSpPr txBox="1"/>
           <p:nvPr/>
         </p:nvSpPr>
         <p:spPr>
           <a:xfrm rot="0">
-            <a:off x="1143000" y="2095500"/>
+            <a:off x="1143000" y="2286000"/>
             <a:ext cx="5715000" cy="2857500"/>
           </a:xfrm>
           <a:prstGeom prst="rect"/>
@@ -3185,13 +3217,13 @@
       </p:sp>
       <p:sp>
         <p:nvSpPr>
-          <p:cNvPr id="9" name=""/>
+          <p:cNvPr id="10" name=""/>
           <p:cNvSpPr txBox="1"/>
           <p:nvPr/>
         </p:nvSpPr>
         <p:spPr>
           <a:xfrm rot="0">
-            <a:off x="1143000" y="2286000"/>
+            <a:off x="1143000" y="2476500"/>
             <a:ext cx="5715000" cy="2857500"/>
           </a:xfrm>
           <a:prstGeom prst="rect"/>
@@ -3217,13 +3249,13 @@
       </p:sp>
       <p:sp>
         <p:nvSpPr>
-          <p:cNvPr id="10" name=""/>
+          <p:cNvPr id="11" name=""/>
           <p:cNvSpPr txBox="1"/>
           <p:nvPr/>
         </p:nvSpPr>
         <p:spPr>
           <a:xfrm rot="0">
-            <a:off x="1143000" y="2476500"/>
+            <a:off x="1143000" y="2667000"/>
             <a:ext cx="5715000" cy="2857500"/>
           </a:xfrm>
           <a:prstGeom prst="rect"/>
@@ -3249,13 +3281,13 @@
       </p:sp>
       <p:sp>
         <p:nvSpPr>
-          <p:cNvPr id="11" name=""/>
+          <p:cNvPr id="12" name=""/>
           <p:cNvSpPr txBox="1"/>
           <p:nvPr/>
         </p:nvSpPr>
         <p:spPr>
           <a:xfrm rot="0">
-            <a:off x="1143000" y="2857500"/>
+            <a:off x="1143000" y="3048000"/>
             <a:ext cx="5715000" cy="2857500"/>
           </a:xfrm>
           <a:prstGeom prst="rect"/>
@@ -3281,13 +3313,13 @@
       </p:sp>
       <p:sp>
         <p:nvSpPr>
-          <p:cNvPr id="12" name=""/>
+          <p:cNvPr id="13" name=""/>
           <p:cNvSpPr txBox="1"/>
           <p:nvPr/>
         </p:nvSpPr>
         <p:spPr>
           <a:xfrm rot="0">
-            <a:off x="1143000" y="3048000"/>
+            <a:off x="1143000" y="3238500"/>
             <a:ext cx="5715000" cy="2857500"/>
           </a:xfrm>
           <a:prstGeom prst="rect"/>

</xml_diff>